<commit_message>
Changed org role to org affiliation
</commit_message>
<xml_diff>
--- a/source/pages/assets/images/diagram3.pptx
+++ b/source/pages/assets/images/diagram3.pptx
@@ -215,7 +215,7 @@
           <a:p>
             <a:fld id="{62CC6149-DCD3-E74D-95A1-F2D3A93C81CE}" type="datetimeFigureOut">
               <a:rPr lang="en-US" smtClean="0"/>
-              <a:t>8/11/2018</a:t>
+              <a:t>7/10/2019</a:t>
             </a:fld>
             <a:endParaRPr lang="en-US" dirty="0"/>
           </a:p>
@@ -381,7 +381,7 @@
           <a:p>
             <a:fld id="{39EE203F-457C-F64E-9721-128CEB4E89CE}" type="datetimeFigureOut">
               <a:rPr lang="en-US" smtClean="0"/>
-              <a:t>8/11/2018</a:t>
+              <a:t>7/10/2019</a:t>
             </a:fld>
             <a:endParaRPr lang="en-US" dirty="0"/>
           </a:p>
@@ -1298,13 +1298,18 @@
           <a:p>
             <a:pPr algn="ctr"/>
             <a:r>
-              <a:rPr lang="en-US" sz="1600" dirty="0">
+              <a:rPr lang="en-US" sz="1600" dirty="0" smtClean="0">
                 <a:solidFill>
                   <a:sysClr val="windowText" lastClr="000000"/>
                 </a:solidFill>
               </a:rPr>
-              <a:t>Role</a:t>
+              <a:t>Affiliation</a:t>
             </a:r>
+            <a:endParaRPr lang="en-US" sz="1600" dirty="0">
+              <a:solidFill>
+                <a:sysClr val="windowText" lastClr="000000"/>
+              </a:solidFill>
+            </a:endParaRPr>
           </a:p>
         </p:txBody>
       </p:sp>
@@ -2993,77 +2998,6 @@
 </file>
 
 <file path=customXml/item1.xml><?xml version="1.0" encoding="utf-8"?>
-<?mso-contentType ?>
-<spe:Receivers xmlns:spe="http://schemas.microsoft.com/sharepoint/events">
-  <Receiver>
-    <Name>Document ID Generator</Name>
-    <Synchronization>Synchronous</Synchronization>
-    <Type>10001</Type>
-    <SequenceNumber>1000</SequenceNumber>
-    <Assembly>Microsoft.Office.DocumentManagement, Version=14.0.0.0, Culture=neutral, PublicKeyToken=71e9bce111e9429c</Assembly>
-    <Class>Microsoft.Office.DocumentManagement.Internal.DocIdHandler</Class>
-    <Data/>
-    <Filter/>
-  </Receiver>
-  <Receiver>
-    <Name>Document ID Generator</Name>
-    <Synchronization>Synchronous</Synchronization>
-    <Type>10002</Type>
-    <SequenceNumber>1001</SequenceNumber>
-    <Assembly>Microsoft.Office.DocumentManagement, Version=14.0.0.0, Culture=neutral, PublicKeyToken=71e9bce111e9429c</Assembly>
-    <Class>Microsoft.Office.DocumentManagement.Internal.DocIdHandler</Class>
-    <Data/>
-    <Filter/>
-  </Receiver>
-  <Receiver>
-    <Name>Document ID Generator</Name>
-    <Synchronization>Synchronous</Synchronization>
-    <Type>10004</Type>
-    <SequenceNumber>1002</SequenceNumber>
-    <Assembly>Microsoft.Office.DocumentManagement, Version=14.0.0.0, Culture=neutral, PublicKeyToken=71e9bce111e9429c</Assembly>
-    <Class>Microsoft.Office.DocumentManagement.Internal.DocIdHandler</Class>
-    <Data/>
-    <Filter/>
-  </Receiver>
-  <Receiver>
-    <Name>Document ID Generator</Name>
-    <Synchronization>Synchronous</Synchronization>
-    <Type>10006</Type>
-    <SequenceNumber>1003</SequenceNumber>
-    <Assembly>Microsoft.Office.DocumentManagement, Version=14.0.0.0, Culture=neutral, PublicKeyToken=71e9bce111e9429c</Assembly>
-    <Class>Microsoft.Office.DocumentManagement.Internal.DocIdHandler</Class>
-    <Data/>
-    <Filter/>
-  </Receiver>
-</spe:Receivers>
-</file>
-
-<file path=customXml/item2.xml><?xml version="1.0" encoding="utf-8"?>
-<p:properties xmlns:p="http://schemas.microsoft.com/office/2006/metadata/properties" xmlns:xsi="http://www.w3.org/2001/XMLSchema-instance" xmlns:pc="http://schemas.microsoft.com/office/infopath/2007/PartnerControls">
-  <documentManagement>
-    <_dlc_DocId xmlns="104ac536-2e3c-4ac9-b234-18e9be322d0c">FMEJVNC76M2R-136-1982</_dlc_DocId>
-    <TAGSTaxHTField0 xmlns="0460abca-03e2-4a8b-bc48-cdd6cbafc9ad">
-      <Terms xmlns="http://schemas.microsoft.com/office/infopath/2007/PartnerControls"/>
-    </TAGSTaxHTField0>
-    <TaxCatchAll xmlns="104ac536-2e3c-4ac9-b234-18e9be322d0c"/>
-    <_dlc_DocIdUrl xmlns="104ac536-2e3c-4ac9-b234-18e9be322d0c">
-      <Url>http://oncintranet.hhs.gov/division/pdnc/ooc/_layouts/DocIdRedir.aspx?ID=FMEJVNC76M2R-136-1982</Url>
-      <Description>FMEJVNC76M2R-136-1982</Description>
-    </_dlc_DocIdUrl>
-  </documentManagement>
-</p:properties>
-</file>
-
-<file path=customXml/item3.xml><?xml version="1.0" encoding="utf-8"?>
-<?mso-contentType ?>
-<FormTemplates xmlns="http://schemas.microsoft.com/sharepoint/v3/contenttype/forms">
-  <Display>DocumentLibraryForm</Display>
-  <Edit>DocumentLibraryForm</Edit>
-  <New>DocumentLibraryForm</New>
-</FormTemplates>
-</file>
-
-<file path=customXml/item4.xml><?xml version="1.0" encoding="utf-8"?>
 <ct:contentTypeSchema xmlns:ct="http://schemas.microsoft.com/office/2006/metadata/contentType" xmlns:ma="http://schemas.microsoft.com/office/2006/metadata/properties/metaAttributes" ct:_="" ma:_="" ma:contentTypeName="Document" ma:contentTypeID="0x010100EB276EA3E56A1F42A379CF48D9857060" ma:contentTypeVersion="10" ma:contentTypeDescription="Create a new document." ma:contentTypeScope="" ma:versionID="7219703b9a2c4f6cbea218b286d1fcdd">
   <xsd:schema xmlns:xsd="http://www.w3.org/2001/XMLSchema" xmlns:xs="http://www.w3.org/2001/XMLSchema" xmlns:p="http://schemas.microsoft.com/office/2006/metadata/properties" xmlns:ns2="104ac536-2e3c-4ac9-b234-18e9be322d0c" xmlns:ns3="0460abca-03e2-4a8b-bc48-cdd6cbafc9ad" targetNamespace="http://schemas.microsoft.com/office/2006/metadata/properties" ma:root="true" ma:fieldsID="6bab689b723ffe52d9cd8c8a345144c7" ns2:_="" ns3:_="">
     <xsd:import namespace="104ac536-2e3c-4ac9-b234-18e9be322d0c"/>
@@ -3233,40 +3167,78 @@
 </ct:contentTypeSchema>
 </file>
 
-<file path=customXml/itemProps1.xml><?xml version="1.0" encoding="utf-8"?>
-<ds:datastoreItem xmlns:ds="http://schemas.openxmlformats.org/officeDocument/2006/customXml" ds:itemID="{B404EC37-1406-4F03-BF44-D2C98F7941FA}">
-  <ds:schemaRefs>
-    <ds:schemaRef ds:uri="http://schemas.microsoft.com/sharepoint/events"/>
-  </ds:schemaRefs>
-</ds:datastoreItem>
+<file path=customXml/item2.xml><?xml version="1.0" encoding="utf-8"?>
+<?mso-contentType ?>
+<FormTemplates xmlns="http://schemas.microsoft.com/sharepoint/v3/contenttype/forms">
+  <Display>DocumentLibraryForm</Display>
+  <Edit>DocumentLibraryForm</Edit>
+  <New>DocumentLibraryForm</New>
+</FormTemplates>
 </file>
 
-<file path=customXml/itemProps2.xml><?xml version="1.0" encoding="utf-8"?>
-<ds:datastoreItem xmlns:ds="http://schemas.openxmlformats.org/officeDocument/2006/customXml" ds:itemID="{014C3E14-501D-42BC-A629-74E6EBB7B91A}">
-  <ds:schemaRefs>
-    <ds:schemaRef ds:uri="http://schemas.microsoft.com/office/2006/metadata/properties"/>
-    <ds:schemaRef ds:uri="http://purl.org/dc/elements/1.1/"/>
-    <ds:schemaRef ds:uri="104ac536-2e3c-4ac9-b234-18e9be322d0c"/>
-    <ds:schemaRef ds:uri="0460abca-03e2-4a8b-bc48-cdd6cbafc9ad"/>
-    <ds:schemaRef ds:uri="http://purl.org/dc/terms/"/>
-    <ds:schemaRef ds:uri="http://schemas.microsoft.com/office/infopath/2007/PartnerControls"/>
-    <ds:schemaRef ds:uri="http://schemas.microsoft.com/office/2006/documentManagement/types"/>
-    <ds:schemaRef ds:uri="http://schemas.openxmlformats.org/package/2006/metadata/core-properties"/>
-    <ds:schemaRef ds:uri="http://www.w3.org/XML/1998/namespace"/>
-    <ds:schemaRef ds:uri="http://purl.org/dc/dcmitype/"/>
-  </ds:schemaRefs>
-</ds:datastoreItem>
+<file path=customXml/item3.xml><?xml version="1.0" encoding="utf-8"?>
+<p:properties xmlns:p="http://schemas.microsoft.com/office/2006/metadata/properties" xmlns:xsi="http://www.w3.org/2001/XMLSchema-instance" xmlns:pc="http://schemas.microsoft.com/office/infopath/2007/PartnerControls">
+  <documentManagement>
+    <_dlc_DocId xmlns="104ac536-2e3c-4ac9-b234-18e9be322d0c">FMEJVNC76M2R-136-1982</_dlc_DocId>
+    <TAGSTaxHTField0 xmlns="0460abca-03e2-4a8b-bc48-cdd6cbafc9ad">
+      <Terms xmlns="http://schemas.microsoft.com/office/infopath/2007/PartnerControls"/>
+    </TAGSTaxHTField0>
+    <TaxCatchAll xmlns="104ac536-2e3c-4ac9-b234-18e9be322d0c"/>
+    <_dlc_DocIdUrl xmlns="104ac536-2e3c-4ac9-b234-18e9be322d0c">
+      <Url>http://oncintranet.hhs.gov/division/pdnc/ooc/_layouts/DocIdRedir.aspx?ID=FMEJVNC76M2R-136-1982</Url>
+      <Description>FMEJVNC76M2R-136-1982</Description>
+    </_dlc_DocIdUrl>
+  </documentManagement>
+</p:properties>
 </file>
 
-<file path=customXml/itemProps3.xml><?xml version="1.0" encoding="utf-8"?>
-<ds:datastoreItem xmlns:ds="http://schemas.openxmlformats.org/officeDocument/2006/customXml" ds:itemID="{CE791015-B97B-4BB9-9954-8EBA5955142F}">
-  <ds:schemaRefs>
-    <ds:schemaRef ds:uri="http://schemas.microsoft.com/sharepoint/v3/contenttype/forms"/>
-  </ds:schemaRefs>
-</ds:datastoreItem>
+<file path=customXml/item4.xml><?xml version="1.0" encoding="utf-8"?>
+<?mso-contentType ?>
+<spe:Receivers xmlns:spe="http://schemas.microsoft.com/sharepoint/events">
+  <Receiver>
+    <Name>Document ID Generator</Name>
+    <Synchronization>Synchronous</Synchronization>
+    <Type>10001</Type>
+    <SequenceNumber>1000</SequenceNumber>
+    <Assembly>Microsoft.Office.DocumentManagement, Version=14.0.0.0, Culture=neutral, PublicKeyToken=71e9bce111e9429c</Assembly>
+    <Class>Microsoft.Office.DocumentManagement.Internal.DocIdHandler</Class>
+    <Data/>
+    <Filter/>
+  </Receiver>
+  <Receiver>
+    <Name>Document ID Generator</Name>
+    <Synchronization>Synchronous</Synchronization>
+    <Type>10002</Type>
+    <SequenceNumber>1001</SequenceNumber>
+    <Assembly>Microsoft.Office.DocumentManagement, Version=14.0.0.0, Culture=neutral, PublicKeyToken=71e9bce111e9429c</Assembly>
+    <Class>Microsoft.Office.DocumentManagement.Internal.DocIdHandler</Class>
+    <Data/>
+    <Filter/>
+  </Receiver>
+  <Receiver>
+    <Name>Document ID Generator</Name>
+    <Synchronization>Synchronous</Synchronization>
+    <Type>10004</Type>
+    <SequenceNumber>1002</SequenceNumber>
+    <Assembly>Microsoft.Office.DocumentManagement, Version=14.0.0.0, Culture=neutral, PublicKeyToken=71e9bce111e9429c</Assembly>
+    <Class>Microsoft.Office.DocumentManagement.Internal.DocIdHandler</Class>
+    <Data/>
+    <Filter/>
+  </Receiver>
+  <Receiver>
+    <Name>Document ID Generator</Name>
+    <Synchronization>Synchronous</Synchronization>
+    <Type>10006</Type>
+    <SequenceNumber>1003</SequenceNumber>
+    <Assembly>Microsoft.Office.DocumentManagement, Version=14.0.0.0, Culture=neutral, PublicKeyToken=71e9bce111e9429c</Assembly>
+    <Class>Microsoft.Office.DocumentManagement.Internal.DocIdHandler</Class>
+    <Data/>
+    <Filter/>
+  </Receiver>
+</spe:Receivers>
 </file>
 
-<file path=customXml/itemProps4.xml><?xml version="1.0" encoding="utf-8"?>
+<file path=customXml/itemProps1.xml><?xml version="1.0" encoding="utf-8"?>
 <ds:datastoreItem xmlns:ds="http://schemas.openxmlformats.org/officeDocument/2006/customXml" ds:itemID="{A2C49151-65FD-497F-92C4-36DE094A22DD}">
   <ds:schemaRefs>
     <ds:schemaRef ds:uri="http://schemas.microsoft.com/office/2006/metadata/contentType"/>
@@ -3283,4 +3255,37 @@
     <ds:schemaRef ds:uri="http://schemas.microsoft.com/internal/obd"/>
   </ds:schemaRefs>
 </ds:datastoreItem>
+</file>
+
+<file path=customXml/itemProps2.xml><?xml version="1.0" encoding="utf-8"?>
+<ds:datastoreItem xmlns:ds="http://schemas.openxmlformats.org/officeDocument/2006/customXml" ds:itemID="{CE791015-B97B-4BB9-9954-8EBA5955142F}">
+  <ds:schemaRefs>
+    <ds:schemaRef ds:uri="http://schemas.microsoft.com/sharepoint/v3/contenttype/forms"/>
+  </ds:schemaRefs>
+</ds:datastoreItem>
+</file>
+
+<file path=customXml/itemProps3.xml><?xml version="1.0" encoding="utf-8"?>
+<ds:datastoreItem xmlns:ds="http://schemas.openxmlformats.org/officeDocument/2006/customXml" ds:itemID="{014C3E14-501D-42BC-A629-74E6EBB7B91A}">
+  <ds:schemaRefs>
+    <ds:schemaRef ds:uri="0460abca-03e2-4a8b-bc48-cdd6cbafc9ad"/>
+    <ds:schemaRef ds:uri="http://schemas.microsoft.com/office/2006/documentManagement/types"/>
+    <ds:schemaRef ds:uri="http://schemas.microsoft.com/office/infopath/2007/PartnerControls"/>
+    <ds:schemaRef ds:uri="http://purl.org/dc/elements/1.1/"/>
+    <ds:schemaRef ds:uri="http://schemas.microsoft.com/office/2006/metadata/properties"/>
+    <ds:schemaRef ds:uri="104ac536-2e3c-4ac9-b234-18e9be322d0c"/>
+    <ds:schemaRef ds:uri="http://purl.org/dc/terms/"/>
+    <ds:schemaRef ds:uri="http://schemas.openxmlformats.org/package/2006/metadata/core-properties"/>
+    <ds:schemaRef ds:uri="http://www.w3.org/XML/1998/namespace"/>
+    <ds:schemaRef ds:uri="http://purl.org/dc/dcmitype/"/>
+  </ds:schemaRefs>
+</ds:datastoreItem>
+</file>
+
+<file path=customXml/itemProps4.xml><?xml version="1.0" encoding="utf-8"?>
+<ds:datastoreItem xmlns:ds="http://schemas.openxmlformats.org/officeDocument/2006/customXml" ds:itemID="{B404EC37-1406-4F03-BF44-D2C98F7941FA}">
+  <ds:schemaRefs>
+    <ds:schemaRef ds:uri="http://schemas.microsoft.com/sharepoint/events"/>
+  </ds:schemaRefs>
+</ds:datastoreItem>
 </file>
</xml_diff>